<commit_message>
Still need to elaborate on model performance
</commit_message>
<xml_diff>
--- a/group-3-M09-final-presentation.pptx
+++ b/group-3-M09-final-presentation.pptx
@@ -7,9 +7,11 @@
   <p:sldIdLst>
     <p:sldId id="292" r:id="rId5"/>
     <p:sldId id="310" r:id="rId6"/>
-    <p:sldId id="311" r:id="rId7"/>
-    <p:sldId id="313" r:id="rId8"/>
-    <p:sldId id="312" r:id="rId9"/>
+    <p:sldId id="314" r:id="rId7"/>
+    <p:sldId id="311" r:id="rId8"/>
+    <p:sldId id="313" r:id="rId9"/>
+    <p:sldId id="315" r:id="rId10"/>
+    <p:sldId id="312" r:id="rId11"/>
   </p:sldIdLst>
   <p:sldSz cx="12192000" cy="6858000"/>
   <p:notesSz cx="6858000" cy="9144000"/>
@@ -4283,7 +4285,12 @@
             <p:ph type="title"/>
           </p:nvPr>
         </p:nvSpPr>
-        <p:spPr/>
+        <p:spPr>
+          <a:xfrm>
+            <a:off x="1066800" y="642594"/>
+            <a:ext cx="10058400" cy="1068219"/>
+          </a:xfrm>
+        </p:spPr>
         <p:txBody>
           <a:bodyPr/>
           <a:lstStyle/>
@@ -4311,45 +4318,117 @@
             <p:ph idx="1"/>
           </p:nvPr>
         </p:nvSpPr>
-        <p:spPr/>
-        <p:txBody>
-          <a:bodyPr/>
+        <p:spPr>
+          <a:xfrm>
+            <a:off x="1066800" y="1465006"/>
+            <a:ext cx="10058400" cy="4750400"/>
+          </a:xfrm>
+        </p:spPr>
+        <p:txBody>
+          <a:bodyPr>
+            <a:normAutofit/>
+          </a:bodyPr>
           <a:lstStyle/>
           <a:p>
             <a:r>
-              <a:rPr lang="en-US" dirty="0"/>
-              <a:t>Overview of data- descriptive stats, telling a story of what we’re doing</a:t>
-            </a:r>
-          </a:p>
-          <a:p>
-            <a:r>
-              <a:rPr lang="en-US" dirty="0"/>
+              <a:rPr lang="en-US" sz="1800" b="0" i="0" dirty="0">
+                <a:effectLst/>
+                <a:latin typeface="Inter"/>
+              </a:rPr>
+              <a:t>This dataset is from the National Institute of Diabetes and Digestive and Kidney Diseases. The goal is to predict whether a patient has diabetes </a:t>
+            </a:r>
+            <a:r>
+              <a:rPr lang="en-US" sz="1800" dirty="0">
+                <a:latin typeface="Inter"/>
+              </a:rPr>
+              <a:t>based on diagnostic measurements. </a:t>
+            </a:r>
+          </a:p>
+          <a:p>
+            <a:r>
+              <a:rPr lang="en-US" sz="1800" dirty="0"/>
               <a:t>Basic narrative:</a:t>
             </a:r>
           </a:p>
           <a:p>
             <a:pPr lvl="1"/>
             <a:r>
-              <a:rPr lang="en-US" dirty="0"/>
-              <a:t>What is our data? Could we include some descriptive stats about the sample population?</a:t>
+              <a:rPr lang="en-US" sz="1800" dirty="0"/>
+              <a:t>Dataset content</a:t>
             </a:r>
           </a:p>
           <a:p>
             <a:pPr lvl="1"/>
             <a:r>
-              <a:rPr lang="en-US" dirty="0"/>
-              <a:t>What do we need to do with our data and our motivations? (e.g. We want to better predict from selected factors who is most at risk of developing or having diabetes).</a:t>
+              <a:rPr lang="en-US" sz="1800" dirty="0"/>
+              <a:t>Objective</a:t>
             </a:r>
           </a:p>
           <a:p>
             <a:pPr lvl="1"/>
             <a:r>
-              <a:rPr lang="en-US" dirty="0"/>
-              <a:t>Preparations: what kind of data processing/cleaning needs to be done?</a:t>
-            </a:r>
-          </a:p>
-        </p:txBody>
-      </p:sp>
+              <a:rPr lang="en-US" sz="1800" dirty="0"/>
+              <a:t>Dataset description – format, missing values, errors, outliers</a:t>
+            </a:r>
+          </a:p>
+          <a:p>
+            <a:pPr lvl="1"/>
+            <a:r>
+              <a:rPr lang="en-US" sz="1800" dirty="0"/>
+              <a:t>Data processing steps: Outlier mitigation, Data Normalization</a:t>
+            </a:r>
+          </a:p>
+          <a:p>
+            <a:pPr marL="274320" lvl="1" indent="0">
+              <a:buNone/>
+            </a:pPr>
+            <a:endParaRPr lang="en-US" sz="1800" dirty="0"/>
+          </a:p>
+          <a:p>
+            <a:pPr marL="274320" lvl="1" indent="0" algn="ctr">
+              <a:buNone/>
+            </a:pPr>
+            <a:r>
+              <a:rPr lang="en-US" sz="1800" dirty="0"/>
+              <a:t>Below is basic  descriptive statistics of dataset with potential outliers highlighted:</a:t>
+            </a:r>
+          </a:p>
+          <a:p>
+            <a:pPr lvl="1"/>
+            <a:endParaRPr lang="en-US" sz="1800" dirty="0"/>
+          </a:p>
+        </p:txBody>
+      </p:sp>
+      <p:pic>
+        <p:nvPicPr>
+          <p:cNvPr id="5" name="Picture 4" descr="Graphical user interface, application&#10;&#10;Description automatically generated">
+            <a:extLst>
+              <a:ext uri="{FF2B5EF4-FFF2-40B4-BE49-F238E27FC236}">
+                <a16:creationId xmlns:a16="http://schemas.microsoft.com/office/drawing/2014/main" id="{E9B8E485-EF91-4B0D-80B2-3F56532451C4}"/>
+              </a:ext>
+            </a:extLst>
+          </p:cNvPr>
+          <p:cNvPicPr>
+            <a:picLocks noChangeAspect="1"/>
+          </p:cNvPicPr>
+          <p:nvPr/>
+        </p:nvPicPr>
+        <p:blipFill>
+          <a:blip r:embed="rId2"/>
+          <a:stretch>
+            <a:fillRect/>
+          </a:stretch>
+        </p:blipFill>
+        <p:spPr>
+          <a:xfrm>
+            <a:off x="1618660" y="4752284"/>
+            <a:ext cx="8954680" cy="1463122"/>
+          </a:xfrm>
+          <a:prstGeom prst="rect">
+            <a:avLst/>
+          </a:prstGeom>
+        </p:spPr>
+      </p:pic>
     </p:spTree>
     <p:extLst>
       <p:ext uri="{BB962C8B-B14F-4D97-AF65-F5344CB8AC3E}">
@@ -4385,7 +4464,7 @@
           <p:cNvPr id="2" name="Title 1">
             <a:extLst>
               <a:ext uri="{FF2B5EF4-FFF2-40B4-BE49-F238E27FC236}">
-                <a16:creationId xmlns:a16="http://schemas.microsoft.com/office/drawing/2014/main" id="{D900A834-FBFE-D613-06E6-906D169BF825}"/>
+                <a16:creationId xmlns:a16="http://schemas.microsoft.com/office/drawing/2014/main" id="{99C88FE0-0EE8-4BD1-BF6C-2C549DD12694}"/>
               </a:ext>
             </a:extLst>
           </p:cNvPr>
@@ -4396,77 +4475,90 @@
             <p:ph type="title"/>
           </p:nvPr>
         </p:nvSpPr>
-        <p:spPr/>
-        <p:txBody>
-          <a:bodyPr/>
+        <p:spPr>
+          <a:xfrm>
+            <a:off x="1066800" y="403124"/>
+            <a:ext cx="10058400" cy="717753"/>
+          </a:xfrm>
+        </p:spPr>
+        <p:txBody>
+          <a:bodyPr>
+            <a:normAutofit/>
+          </a:bodyPr>
           <a:lstStyle/>
           <a:p>
             <a:r>
-              <a:rPr lang="en-US" dirty="0"/>
-              <a:t>Feature Engineering and Hyperparameters</a:t>
-            </a:r>
-          </a:p>
-        </p:txBody>
-      </p:sp>
-      <p:sp>
-        <p:nvSpPr>
-          <p:cNvPr id="3" name="Content Placeholder 2">
+              <a:rPr lang="en-US" sz="3000" dirty="0">
+                <a:latin typeface="Inter"/>
+              </a:rPr>
+              <a:t>Data Normalization and Outlier mitigation codes</a:t>
+            </a:r>
+          </a:p>
+        </p:txBody>
+      </p:sp>
+      <p:pic>
+        <p:nvPicPr>
+          <p:cNvPr id="13" name="Content Placeholder 9" descr="Graphical user interface, text, application&#10;&#10;Description automatically generated">
             <a:extLst>
               <a:ext uri="{FF2B5EF4-FFF2-40B4-BE49-F238E27FC236}">
-                <a16:creationId xmlns:a16="http://schemas.microsoft.com/office/drawing/2014/main" id="{20EE6161-987E-B286-770D-351C18582CC3}"/>
+                <a16:creationId xmlns:a16="http://schemas.microsoft.com/office/drawing/2014/main" id="{201DBB0E-8752-4FB0-B648-D207AF14FEE4}"/>
               </a:ext>
             </a:extLst>
           </p:cNvPr>
-          <p:cNvSpPr>
-            <a:spLocks noGrp="1"/>
-          </p:cNvSpPr>
-          <p:nvPr>
-            <p:ph idx="1"/>
-          </p:nvPr>
-        </p:nvSpPr>
-        <p:spPr/>
-        <p:txBody>
-          <a:bodyPr/>
-          <a:lstStyle/>
-          <a:p>
-            <a:r>
-              <a:rPr lang="en-US" dirty="0"/>
-              <a:t>Story of fine-tuning the models and choosing features: </a:t>
-            </a:r>
-          </a:p>
-          <a:p>
-            <a:pPr lvl="1"/>
-            <a:r>
-              <a:rPr lang="en-US" dirty="0"/>
-              <a:t>Are there any unnecessary features? </a:t>
-            </a:r>
-          </a:p>
-          <a:p>
-            <a:pPr lvl="1"/>
-            <a:r>
-              <a:rPr lang="en-US" dirty="0"/>
-              <a:t>Are there any changes to hyperparameters that improve performance? </a:t>
-            </a:r>
-            <a:r>
-              <a:rPr lang="en-US"/>
-              <a:t>If </a:t>
-            </a:r>
-            <a:r>
-              <a:rPr lang="en-US" dirty="0"/>
-              <a:t>possible, we could speculate as to why they improve/</a:t>
-            </a:r>
-            <a:r>
-              <a:rPr lang="en-US"/>
-              <a:t>harm performance.</a:t>
-            </a:r>
-            <a:endParaRPr lang="en-US" dirty="0"/>
-          </a:p>
-        </p:txBody>
-      </p:sp>
+          <p:cNvPicPr>
+            <a:picLocks noGrp="1" noChangeAspect="1"/>
+          </p:cNvPicPr>
+          <p:nvPr>
+            <p:ph sz="half" idx="2"/>
+          </p:nvPr>
+        </p:nvPicPr>
+        <p:blipFill>
+          <a:blip r:embed="rId2"/>
+          <a:stretch>
+            <a:fillRect/>
+          </a:stretch>
+        </p:blipFill>
+        <p:spPr>
+          <a:xfrm>
+            <a:off x="1430592" y="3716325"/>
+            <a:ext cx="9561872" cy="2459312"/>
+          </a:xfrm>
+        </p:spPr>
+      </p:pic>
+      <p:pic>
+        <p:nvPicPr>
+          <p:cNvPr id="28" name="Picture 27" descr="Text&#10;&#10;Description automatically generated with medium confidence">
+            <a:extLst>
+              <a:ext uri="{FF2B5EF4-FFF2-40B4-BE49-F238E27FC236}">
+                <a16:creationId xmlns:a16="http://schemas.microsoft.com/office/drawing/2014/main" id="{2E2C374A-F425-4B04-BBF7-105D2BC0218F}"/>
+              </a:ext>
+            </a:extLst>
+          </p:cNvPr>
+          <p:cNvPicPr>
+            <a:picLocks noChangeAspect="1"/>
+          </p:cNvPicPr>
+          <p:nvPr/>
+        </p:nvPicPr>
+        <p:blipFill>
+          <a:blip r:embed="rId3"/>
+          <a:stretch>
+            <a:fillRect/>
+          </a:stretch>
+        </p:blipFill>
+        <p:spPr>
+          <a:xfrm>
+            <a:off x="1430592" y="969689"/>
+            <a:ext cx="9561872" cy="2459311"/>
+          </a:xfrm>
+          <a:prstGeom prst="rect">
+            <a:avLst/>
+          </a:prstGeom>
+        </p:spPr>
+      </p:pic>
     </p:spTree>
     <p:extLst>
       <p:ext uri="{BB962C8B-B14F-4D97-AF65-F5344CB8AC3E}">
-        <p14:creationId xmlns:p14="http://schemas.microsoft.com/office/powerpoint/2010/main" val="2480184923"/>
+        <p14:creationId xmlns:p14="http://schemas.microsoft.com/office/powerpoint/2010/main" val="2052374049"/>
       </p:ext>
     </p:extLst>
   </p:cSld>
@@ -4498,7 +4590,7 @@
           <p:cNvPr id="2" name="Title 1">
             <a:extLst>
               <a:ext uri="{FF2B5EF4-FFF2-40B4-BE49-F238E27FC236}">
-                <a16:creationId xmlns:a16="http://schemas.microsoft.com/office/drawing/2014/main" id="{6D433C58-C65C-E94A-9829-CFF914B05C31}"/>
+                <a16:creationId xmlns:a16="http://schemas.microsoft.com/office/drawing/2014/main" id="{D900A834-FBFE-D613-06E6-906D169BF825}"/>
               </a:ext>
             </a:extLst>
           </p:cNvPr>
@@ -4516,7 +4608,7 @@
           <a:p>
             <a:r>
               <a:rPr lang="en-US" dirty="0"/>
-              <a:t>Coding Samples</a:t>
+              <a:t>Feature Engineering and Hyperparameters</a:t>
             </a:r>
           </a:p>
         </p:txBody>
@@ -4526,7 +4618,7 @@
           <p:cNvPr id="3" name="Content Placeholder 2">
             <a:extLst>
               <a:ext uri="{FF2B5EF4-FFF2-40B4-BE49-F238E27FC236}">
-                <a16:creationId xmlns:a16="http://schemas.microsoft.com/office/drawing/2014/main" id="{105AEF5E-7B97-811C-121F-59468F9E9C6F}"/>
+                <a16:creationId xmlns:a16="http://schemas.microsoft.com/office/drawing/2014/main" id="{20EE6161-987E-B286-770D-351C18582CC3}"/>
               </a:ext>
             </a:extLst>
           </p:cNvPr>
@@ -4537,22 +4629,100 @@
             <p:ph idx="1"/>
           </p:nvPr>
         </p:nvSpPr>
-        <p:spPr/>
-        <p:txBody>
-          <a:bodyPr/>
+        <p:spPr>
+          <a:xfrm>
+            <a:off x="1066800" y="1632155"/>
+            <a:ext cx="10058400" cy="2094271"/>
+          </a:xfrm>
+        </p:spPr>
+        <p:txBody>
+          <a:bodyPr>
+            <a:normAutofit/>
+          </a:bodyPr>
           <a:lstStyle/>
           <a:p>
             <a:r>
-              <a:rPr lang="en-US" dirty="0"/>
-              <a:t>Insert Code here</a:t>
-            </a:r>
-          </a:p>
-        </p:txBody>
-      </p:sp>
+              <a:rPr lang="en-US" sz="1800" dirty="0">
+                <a:latin typeface="Inter"/>
+              </a:rPr>
+              <a:t>The following steps were taken to get dataset ready for model training: </a:t>
+            </a:r>
+          </a:p>
+          <a:p>
+            <a:pPr lvl="1"/>
+            <a:r>
+              <a:rPr lang="en-US" sz="1800" dirty="0">
+                <a:latin typeface="Inter"/>
+              </a:rPr>
+              <a:t>All features were considered necessary based on descriptive statistics report analysis</a:t>
+            </a:r>
+          </a:p>
+          <a:p>
+            <a:pPr lvl="1"/>
+            <a:r>
+              <a:rPr lang="en-US" sz="1800" dirty="0">
+                <a:latin typeface="Inter"/>
+              </a:rPr>
+              <a:t>Dataset was split into target (Outcome) and training (All the rest) features to feed the model.</a:t>
+            </a:r>
+          </a:p>
+          <a:p>
+            <a:pPr lvl="1"/>
+            <a:r>
+              <a:rPr lang="en-US" sz="1800" dirty="0">
+                <a:latin typeface="Inter"/>
+              </a:rPr>
+              <a:t>To ensure best score by the model, we selected 2 different sets of hyperparameter values using </a:t>
+            </a:r>
+            <a:r>
+              <a:rPr lang="en-US" sz="1800" dirty="0" err="1">
+                <a:latin typeface="Inter"/>
+              </a:rPr>
+              <a:t>GridSearchCV</a:t>
+            </a:r>
+            <a:r>
+              <a:rPr lang="en-US" sz="1800" dirty="0">
+                <a:latin typeface="Inter"/>
+              </a:rPr>
+              <a:t> along with 2 folds for cross validation on each set to train our model and find best prediction score. </a:t>
+            </a:r>
+          </a:p>
+        </p:txBody>
+      </p:sp>
+      <p:pic>
+        <p:nvPicPr>
+          <p:cNvPr id="5" name="Picture 4" descr="Text&#10;&#10;Description automatically generated">
+            <a:extLst>
+              <a:ext uri="{FF2B5EF4-FFF2-40B4-BE49-F238E27FC236}">
+                <a16:creationId xmlns:a16="http://schemas.microsoft.com/office/drawing/2014/main" id="{47CA2199-B018-4683-97B6-BB9DF6D6C314}"/>
+              </a:ext>
+            </a:extLst>
+          </p:cNvPr>
+          <p:cNvPicPr>
+            <a:picLocks noChangeAspect="1"/>
+          </p:cNvPicPr>
+          <p:nvPr/>
+        </p:nvPicPr>
+        <p:blipFill>
+          <a:blip r:embed="rId2"/>
+          <a:stretch>
+            <a:fillRect/>
+          </a:stretch>
+        </p:blipFill>
+        <p:spPr>
+          <a:xfrm>
+            <a:off x="1619261" y="3726426"/>
+            <a:ext cx="7308430" cy="2324301"/>
+          </a:xfrm>
+          <a:prstGeom prst="rect">
+            <a:avLst/>
+          </a:prstGeom>
+        </p:spPr>
+      </p:pic>
     </p:spTree>
     <p:extLst>
       <p:ext uri="{BB962C8B-B14F-4D97-AF65-F5344CB8AC3E}">
-        <p14:creationId xmlns:p14="http://schemas.microsoft.com/office/powerpoint/2010/main" val="268658346"/>
+        <p14:creationId xmlns:p14="http://schemas.microsoft.com/office/powerpoint/2010/main" val="2480184923"/>
       </p:ext>
     </p:extLst>
   </p:cSld>
@@ -4584,6 +4754,254 @@
           <p:cNvPr id="2" name="Title 1">
             <a:extLst>
               <a:ext uri="{FF2B5EF4-FFF2-40B4-BE49-F238E27FC236}">
+                <a16:creationId xmlns:a16="http://schemas.microsoft.com/office/drawing/2014/main" id="{6D433C58-C65C-E94A-9829-CFF914B05C31}"/>
+              </a:ext>
+            </a:extLst>
+          </p:cNvPr>
+          <p:cNvSpPr>
+            <a:spLocks noGrp="1"/>
+          </p:cNvSpPr>
+          <p:nvPr>
+            <p:ph type="title"/>
+          </p:nvPr>
+        </p:nvSpPr>
+        <p:spPr>
+          <a:xfrm>
+            <a:off x="1066800" y="334626"/>
+            <a:ext cx="10058400" cy="599439"/>
+          </a:xfrm>
+        </p:spPr>
+        <p:txBody>
+          <a:bodyPr>
+            <a:normAutofit/>
+          </a:bodyPr>
+          <a:lstStyle/>
+          <a:p>
+            <a:r>
+              <a:rPr lang="en-US" sz="3200" dirty="0"/>
+              <a:t>Default hyperparameter</a:t>
+            </a:r>
+          </a:p>
+        </p:txBody>
+      </p:sp>
+      <p:pic>
+        <p:nvPicPr>
+          <p:cNvPr id="5" name="Content Placeholder 4" descr="Graphical user interface, text, application, email&#10;&#10;Description automatically generated">
+            <a:extLst>
+              <a:ext uri="{FF2B5EF4-FFF2-40B4-BE49-F238E27FC236}">
+                <a16:creationId xmlns:a16="http://schemas.microsoft.com/office/drawing/2014/main" id="{6DF642E8-819B-4E05-B81B-4F881DDE6DC3}"/>
+              </a:ext>
+            </a:extLst>
+          </p:cNvPr>
+          <p:cNvPicPr>
+            <a:picLocks noGrp="1" noChangeAspect="1"/>
+          </p:cNvPicPr>
+          <p:nvPr>
+            <p:ph idx="1"/>
+          </p:nvPr>
+        </p:nvPicPr>
+        <p:blipFill>
+          <a:blip r:embed="rId2"/>
+          <a:stretch>
+            <a:fillRect/>
+          </a:stretch>
+        </p:blipFill>
+        <p:spPr>
+          <a:xfrm>
+            <a:off x="1474838" y="934065"/>
+            <a:ext cx="8868697" cy="2684206"/>
+          </a:xfrm>
+        </p:spPr>
+      </p:pic>
+      <p:pic>
+        <p:nvPicPr>
+          <p:cNvPr id="7" name="Picture 6" descr="Chart&#10;&#10;Description automatically generated">
+            <a:extLst>
+              <a:ext uri="{FF2B5EF4-FFF2-40B4-BE49-F238E27FC236}">
+                <a16:creationId xmlns:a16="http://schemas.microsoft.com/office/drawing/2014/main" id="{1F23E048-6DE4-47FB-B0EF-22494258CA25}"/>
+              </a:ext>
+            </a:extLst>
+          </p:cNvPr>
+          <p:cNvPicPr>
+            <a:picLocks noChangeAspect="1"/>
+          </p:cNvPicPr>
+          <p:nvPr/>
+        </p:nvPicPr>
+        <p:blipFill>
+          <a:blip r:embed="rId3"/>
+          <a:stretch>
+            <a:fillRect/>
+          </a:stretch>
+        </p:blipFill>
+        <p:spPr>
+          <a:xfrm>
+            <a:off x="1474838" y="3618271"/>
+            <a:ext cx="8868697" cy="2597135"/>
+          </a:xfrm>
+          <a:prstGeom prst="rect">
+            <a:avLst/>
+          </a:prstGeom>
+        </p:spPr>
+      </p:pic>
+    </p:spTree>
+    <p:extLst>
+      <p:ext uri="{BB962C8B-B14F-4D97-AF65-F5344CB8AC3E}">
+        <p14:creationId xmlns:p14="http://schemas.microsoft.com/office/powerpoint/2010/main" val="268658346"/>
+      </p:ext>
+    </p:extLst>
+  </p:cSld>
+  <p:clrMapOvr>
+    <a:masterClrMapping/>
+  </p:clrMapOvr>
+</p:sld>
+</file>
+
+<file path=ppt/slides/slide6.xml><?xml version="1.0" encoding="utf-8"?>
+<p:sld xmlns:a="http://schemas.openxmlformats.org/drawingml/2006/main" xmlns:r="http://schemas.openxmlformats.org/officeDocument/2006/relationships" xmlns:p="http://schemas.openxmlformats.org/presentationml/2006/main">
+  <p:cSld>
+    <p:spTree>
+      <p:nvGrpSpPr>
+        <p:cNvPr id="1" name=""/>
+        <p:cNvGrpSpPr/>
+        <p:nvPr/>
+      </p:nvGrpSpPr>
+      <p:grpSpPr>
+        <a:xfrm>
+          <a:off x="0" y="0"/>
+          <a:ext cx="0" cy="0"/>
+          <a:chOff x="0" y="0"/>
+          <a:chExt cx="0" cy="0"/>
+        </a:xfrm>
+      </p:grpSpPr>
+      <p:sp>
+        <p:nvSpPr>
+          <p:cNvPr id="2" name="Title 1">
+            <a:extLst>
+              <a:ext uri="{FF2B5EF4-FFF2-40B4-BE49-F238E27FC236}">
+                <a16:creationId xmlns:a16="http://schemas.microsoft.com/office/drawing/2014/main" id="{622FB843-0E81-4C56-A094-FB1D30BA014E}"/>
+              </a:ext>
+            </a:extLst>
+          </p:cNvPr>
+          <p:cNvSpPr>
+            <a:spLocks noGrp="1"/>
+          </p:cNvSpPr>
+          <p:nvPr>
+            <p:ph type="title"/>
+          </p:nvPr>
+        </p:nvSpPr>
+        <p:spPr>
+          <a:xfrm>
+            <a:off x="1066800" y="373955"/>
+            <a:ext cx="10058400" cy="537277"/>
+          </a:xfrm>
+        </p:spPr>
+        <p:txBody>
+          <a:bodyPr>
+            <a:normAutofit fontScale="90000"/>
+          </a:bodyPr>
+          <a:lstStyle/>
+          <a:p>
+            <a:r>
+              <a:rPr lang="en-US" dirty="0"/>
+              <a:t>Tuning hyperparameters</a:t>
+            </a:r>
+          </a:p>
+        </p:txBody>
+      </p:sp>
+      <p:pic>
+        <p:nvPicPr>
+          <p:cNvPr id="5" name="Content Placeholder 4" descr="Graphical user interface, text, application&#10;&#10;Description automatically generated">
+            <a:extLst>
+              <a:ext uri="{FF2B5EF4-FFF2-40B4-BE49-F238E27FC236}">
+                <a16:creationId xmlns:a16="http://schemas.microsoft.com/office/drawing/2014/main" id="{3AE00C67-C722-4B76-8FE3-8B514C289EF0}"/>
+              </a:ext>
+            </a:extLst>
+          </p:cNvPr>
+          <p:cNvPicPr>
+            <a:picLocks noGrp="1" noChangeAspect="1"/>
+          </p:cNvPicPr>
+          <p:nvPr>
+            <p:ph idx="1"/>
+          </p:nvPr>
+        </p:nvPicPr>
+        <p:blipFill>
+          <a:blip r:embed="rId2"/>
+          <a:stretch>
+            <a:fillRect/>
+          </a:stretch>
+        </p:blipFill>
+        <p:spPr>
+          <a:xfrm>
+            <a:off x="1504335" y="911232"/>
+            <a:ext cx="9016180" cy="2556847"/>
+          </a:xfrm>
+        </p:spPr>
+      </p:pic>
+      <p:pic>
+        <p:nvPicPr>
+          <p:cNvPr id="7" name="Picture 6" descr="Graphical user interface, application&#10;&#10;Description automatically generated">
+            <a:extLst>
+              <a:ext uri="{FF2B5EF4-FFF2-40B4-BE49-F238E27FC236}">
+                <a16:creationId xmlns:a16="http://schemas.microsoft.com/office/drawing/2014/main" id="{F93FE730-CDFD-4F3D-B7B7-5E645E9055E9}"/>
+              </a:ext>
+            </a:extLst>
+          </p:cNvPr>
+          <p:cNvPicPr>
+            <a:picLocks noChangeAspect="1"/>
+          </p:cNvPicPr>
+          <p:nvPr/>
+        </p:nvPicPr>
+        <p:blipFill>
+          <a:blip r:embed="rId3"/>
+          <a:stretch>
+            <a:fillRect/>
+          </a:stretch>
+        </p:blipFill>
+        <p:spPr>
+          <a:xfrm>
+            <a:off x="1504335" y="3468079"/>
+            <a:ext cx="9016181" cy="2747327"/>
+          </a:xfrm>
+          <a:prstGeom prst="rect">
+            <a:avLst/>
+          </a:prstGeom>
+        </p:spPr>
+      </p:pic>
+    </p:spTree>
+    <p:extLst>
+      <p:ext uri="{BB962C8B-B14F-4D97-AF65-F5344CB8AC3E}">
+        <p14:creationId xmlns:p14="http://schemas.microsoft.com/office/powerpoint/2010/main" val="1801122850"/>
+      </p:ext>
+    </p:extLst>
+  </p:cSld>
+  <p:clrMapOvr>
+    <a:masterClrMapping/>
+  </p:clrMapOvr>
+</p:sld>
+</file>
+
+<file path=ppt/slides/slide7.xml><?xml version="1.0" encoding="utf-8"?>
+<p:sld xmlns:a="http://schemas.openxmlformats.org/drawingml/2006/main" xmlns:r="http://schemas.openxmlformats.org/officeDocument/2006/relationships" xmlns:p="http://schemas.openxmlformats.org/presentationml/2006/main">
+  <p:cSld>
+    <p:spTree>
+      <p:nvGrpSpPr>
+        <p:cNvPr id="1" name=""/>
+        <p:cNvGrpSpPr/>
+        <p:nvPr/>
+      </p:nvGrpSpPr>
+      <p:grpSpPr>
+        <a:xfrm>
+          <a:off x="0" y="0"/>
+          <a:ext cx="0" cy="0"/>
+          <a:chOff x="0" y="0"/>
+          <a:chExt cx="0" cy="0"/>
+        </a:xfrm>
+      </p:grpSpPr>
+      <p:sp>
+        <p:nvSpPr>
+          <p:cNvPr id="2" name="Title 1">
+            <a:extLst>
+              <a:ext uri="{FF2B5EF4-FFF2-40B4-BE49-F238E27FC236}">
                 <a16:creationId xmlns:a16="http://schemas.microsoft.com/office/drawing/2014/main" id="{7B88D576-4CF7-289C-CBB5-9DA77F1C440B}"/>
               </a:ext>
             </a:extLst>
@@ -4595,55 +5013,196 @@
             <p:ph type="title"/>
           </p:nvPr>
         </p:nvSpPr>
-        <p:spPr/>
-        <p:txBody>
-          <a:bodyPr/>
+        <p:spPr>
+          <a:xfrm>
+            <a:off x="1066800" y="416452"/>
+            <a:ext cx="10058400" cy="606103"/>
+          </a:xfrm>
+        </p:spPr>
+        <p:txBody>
+          <a:bodyPr>
+            <a:normAutofit/>
+          </a:bodyPr>
           <a:lstStyle/>
           <a:p>
             <a:r>
-              <a:rPr lang="en-US" dirty="0"/>
-              <a:t>Assessing Performance</a:t>
-            </a:r>
-          </a:p>
-        </p:txBody>
-      </p:sp>
-      <p:sp>
-        <p:nvSpPr>
-          <p:cNvPr id="3" name="Content Placeholder 2">
+              <a:rPr lang="en-US" sz="3200" dirty="0"/>
+              <a:t>Comparing performance against </a:t>
+            </a:r>
+            <a:r>
+              <a:rPr lang="en-US" sz="3200" dirty="0" err="1"/>
+              <a:t>LogisticRegression</a:t>
+            </a:r>
+            <a:endParaRPr lang="en-US" sz="3200" dirty="0"/>
+          </a:p>
+        </p:txBody>
+      </p:sp>
+      <p:pic>
+        <p:nvPicPr>
+          <p:cNvPr id="5" name="Content Placeholder 4" descr="Graphical user interface, text, application&#10;&#10;Description automatically generated">
             <a:extLst>
               <a:ext uri="{FF2B5EF4-FFF2-40B4-BE49-F238E27FC236}">
-                <a16:creationId xmlns:a16="http://schemas.microsoft.com/office/drawing/2014/main" id="{70F8E697-2460-6D6A-53EA-E18CA0F25EF1}"/>
+                <a16:creationId xmlns:a16="http://schemas.microsoft.com/office/drawing/2014/main" id="{045885BB-10C3-4F0A-AEE7-F7A52FE0AF50}"/>
               </a:ext>
             </a:extLst>
           </p:cNvPr>
-          <p:cNvSpPr>
-            <a:spLocks noGrp="1"/>
-          </p:cNvSpPr>
+          <p:cNvPicPr>
+            <a:picLocks noGrp="1" noChangeAspect="1"/>
+          </p:cNvPicPr>
           <p:nvPr>
             <p:ph idx="1"/>
           </p:nvPr>
-        </p:nvSpPr>
-        <p:spPr/>
-        <p:txBody>
-          <a:bodyPr/>
-          <a:lstStyle/>
-          <a:p>
-            <a:r>
-              <a:rPr lang="en-US" dirty="0"/>
-              <a:t>How successful is the model?</a:t>
-            </a:r>
-          </a:p>
-          <a:p>
-            <a:r>
-              <a:rPr lang="en-US" dirty="0"/>
-              <a:t>Compare with logistic regression: is it better, the same, or worse?</a:t>
-            </a:r>
-          </a:p>
-          <a:p>
-            <a:r>
-              <a:rPr lang="en-US" dirty="0"/>
-              <a:t>What are the model’s limitations and how might it be improved?</a:t>
-            </a:r>
+        </p:nvPicPr>
+        <p:blipFill>
+          <a:blip r:embed="rId2"/>
+          <a:stretch>
+            <a:fillRect/>
+          </a:stretch>
+        </p:blipFill>
+        <p:spPr>
+          <a:xfrm>
+            <a:off x="1358317" y="1007026"/>
+            <a:ext cx="8611697" cy="2406445"/>
+          </a:xfrm>
+        </p:spPr>
+      </p:pic>
+      <p:sp>
+        <p:nvSpPr>
+          <p:cNvPr id="9" name="Title 1">
+            <a:extLst>
+              <a:ext uri="{FF2B5EF4-FFF2-40B4-BE49-F238E27FC236}">
+                <a16:creationId xmlns:a16="http://schemas.microsoft.com/office/drawing/2014/main" id="{6B9BEE4E-C6D5-4435-B8F9-5E8773CBE716}"/>
+              </a:ext>
+            </a:extLst>
+          </p:cNvPr>
+          <p:cNvSpPr txBox="1">
+            <a:spLocks/>
+          </p:cNvSpPr>
+          <p:nvPr/>
+        </p:nvSpPr>
+        <p:spPr>
+          <a:xfrm>
+            <a:off x="1251625" y="3595108"/>
+            <a:ext cx="10058400" cy="2255865"/>
+          </a:xfrm>
+          <a:prstGeom prst="rect">
+            <a:avLst/>
+          </a:prstGeom>
+        </p:spPr>
+        <p:txBody>
+          <a:bodyPr vert="horz" lIns="91440" tIns="45720" rIns="91440" bIns="45720" rtlCol="0" anchor="ctr">
+            <a:normAutofit fontScale="97500"/>
+          </a:bodyPr>
+          <a:lstStyle>
+            <a:lvl1pPr algn="l" defTabSz="914400" rtl="0" eaLnBrk="1" latinLnBrk="0" hangingPunct="1">
+              <a:lnSpc>
+                <a:spcPct val="90000"/>
+              </a:lnSpc>
+              <a:spcBef>
+                <a:spcPct val="0"/>
+              </a:spcBef>
+              <a:buNone/>
+              <a:defRPr lang="en-US" sz="3600" i="0" kern="1200" cap="none" spc="0" baseline="0" dirty="0">
+                <a:solidFill>
+                  <a:schemeClr val="tx1">
+                    <a:lumMod val="85000"/>
+                    <a:lumOff val="15000"/>
+                  </a:schemeClr>
+                </a:solidFill>
+                <a:effectLst/>
+                <a:latin typeface="+mj-lt"/>
+                <a:ea typeface="+mn-ea"/>
+                <a:cs typeface="+mn-cs"/>
+              </a:defRPr>
+            </a:lvl1pPr>
+          </a:lstStyle>
+          <a:p>
+            <a:pPr marL="285750" indent="-285750">
+              <a:buFont typeface="Courier New" panose="02070309020205020404" pitchFamily="49" charset="0"/>
+              <a:buChar char="o"/>
+            </a:pPr>
+            <a:r>
+              <a:rPr lang="en-US" sz="1800" dirty="0">
+                <a:latin typeface="Inter"/>
+              </a:rPr>
+              <a:t>SVM model achieved 78.12% accuracy on default hyperparameters and 79.69% after tuning hyperparameters</a:t>
+            </a:r>
+          </a:p>
+          <a:p>
+            <a:pPr marL="285750" indent="-285750">
+              <a:buFont typeface="Courier New" panose="02070309020205020404" pitchFamily="49" charset="0"/>
+              <a:buChar char="o"/>
+            </a:pPr>
+            <a:r>
+              <a:rPr lang="en-US" sz="1800" dirty="0" err="1">
+                <a:latin typeface="Inter"/>
+              </a:rPr>
+              <a:t>LogistirRegression</a:t>
+            </a:r>
+            <a:r>
+              <a:rPr lang="en-US" sz="1800" dirty="0">
+                <a:latin typeface="Inter"/>
+              </a:rPr>
+              <a:t> achieved 80.7% on default hyperparameters</a:t>
+            </a:r>
+          </a:p>
+          <a:p>
+            <a:pPr marL="285750" indent="-285750">
+              <a:buFont typeface="Courier New" panose="02070309020205020404" pitchFamily="49" charset="0"/>
+              <a:buChar char="o"/>
+            </a:pPr>
+            <a:r>
+              <a:rPr lang="en-US" sz="1800" dirty="0">
+                <a:latin typeface="Inter"/>
+              </a:rPr>
+              <a:t>Performance speed on moth models were different</a:t>
+            </a:r>
+          </a:p>
+          <a:p>
+            <a:pPr marL="285750" indent="-285750">
+              <a:buFont typeface="Courier New" panose="02070309020205020404" pitchFamily="49" charset="0"/>
+              <a:buChar char="o"/>
+            </a:pPr>
+            <a:r>
+              <a:rPr lang="en-US" sz="1800" dirty="0">
+                <a:latin typeface="Inter"/>
+              </a:rPr>
+              <a:t>MCC for SVM = 0.51</a:t>
+            </a:r>
+          </a:p>
+          <a:p>
+            <a:pPr marL="285750" indent="-285750">
+              <a:buFont typeface="Courier New" panose="02070309020205020404" pitchFamily="49" charset="0"/>
+              <a:buChar char="o"/>
+            </a:pPr>
+            <a:r>
+              <a:rPr lang="en-US" sz="1800" dirty="0">
+                <a:latin typeface="Inter"/>
+              </a:rPr>
+              <a:t>MCC for </a:t>
+            </a:r>
+            <a:r>
+              <a:rPr lang="en-US" sz="1800" dirty="0" err="1">
+                <a:latin typeface="Inter"/>
+              </a:rPr>
+              <a:t>LogisticRegression</a:t>
+            </a:r>
+            <a:r>
+              <a:rPr lang="en-US" sz="1800" dirty="0">
+                <a:latin typeface="Inter"/>
+              </a:rPr>
+              <a:t> = 0.54</a:t>
+            </a:r>
+          </a:p>
+          <a:p>
+            <a:br>
+              <a:rPr lang="en-US" sz="1800" dirty="0">
+                <a:latin typeface="Inter"/>
+              </a:rPr>
+            </a:br>
+            <a:endParaRPr lang="en-US" sz="1800" dirty="0">
+              <a:latin typeface="Inter"/>
+            </a:endParaRPr>
           </a:p>
         </p:txBody>
       </p:sp>
@@ -4989,15 +5548,6 @@
 </file>
 
 <file path=customXml/item2.xml><?xml version="1.0" encoding="utf-8"?>
-<p:properties xmlns:p="http://schemas.microsoft.com/office/2006/metadata/properties" xmlns:xsi="http://www.w3.org/2001/XMLSchema-instance" xmlns:pc="http://schemas.microsoft.com/office/infopath/2007/PartnerControls">
-  <documentManagement>
-    <Status xmlns="71af3243-3dd4-4a8d-8c0d-dd76da1f02a5">Not started</Status>
-    <MediaServiceKeyPoints xmlns="71af3243-3dd4-4a8d-8c0d-dd76da1f02a5" xsi:nil="true"/>
-  </documentManagement>
-</p:properties>
-</file>
-
-<file path=customXml/item3.xml><?xml version="1.0" encoding="utf-8"?>
 <ct:contentTypeSchema xmlns:ct="http://schemas.microsoft.com/office/2006/metadata/contentType" xmlns:ma="http://schemas.microsoft.com/office/2006/metadata/properties/metaAttributes" ct:_="" ma:_="" ma:contentTypeName="Document" ma:contentTypeID="0x01010079F111ED35F8CC479449609E8A0923A6" ma:contentTypeVersion="12" ma:contentTypeDescription="Create a new document." ma:contentTypeScope="" ma:versionID="a410dd7f93c95333ffa1b60ed6adedd1">
   <xsd:schema xmlns:xsd="http://www.w3.org/2001/XMLSchema" xmlns:xs="http://www.w3.org/2001/XMLSchema" xmlns:p="http://schemas.microsoft.com/office/2006/metadata/properties" xmlns:ns2="71af3243-3dd4-4a8d-8c0d-dd76da1f02a5" xmlns:ns3="16c05727-aa75-4e4a-9b5f-8a80a1165891" targetNamespace="http://schemas.microsoft.com/office/2006/metadata/properties" ma:root="true" ma:fieldsID="a936d9baba76aa3866493feff160faab" ns2:_="" ns3:_="">
     <xsd:import namespace="71af3243-3dd4-4a8d-8c0d-dd76da1f02a5"/>
@@ -5218,6 +5768,15 @@
 </ct:contentTypeSchema>
 </file>
 
+<file path=customXml/item3.xml><?xml version="1.0" encoding="utf-8"?>
+<p:properties xmlns:p="http://schemas.microsoft.com/office/2006/metadata/properties" xmlns:xsi="http://www.w3.org/2001/XMLSchema-instance" xmlns:pc="http://schemas.microsoft.com/office/infopath/2007/PartnerControls">
+  <documentManagement>
+    <Status xmlns="71af3243-3dd4-4a8d-8c0d-dd76da1f02a5">Not started</Status>
+    <MediaServiceKeyPoints xmlns="71af3243-3dd4-4a8d-8c0d-dd76da1f02a5" xsi:nil="true"/>
+  </documentManagement>
+</p:properties>
+</file>
+
 <file path=customXml/itemProps1.xml><?xml version="1.0" encoding="utf-8"?>
 <ds:datastoreItem xmlns:ds="http://schemas.openxmlformats.org/officeDocument/2006/customXml" ds:itemID="{AE2713E1-6312-427E-BFCB-C5A5DA301373}">
   <ds:schemaRefs>
@@ -5227,16 +5786,6 @@
 </file>
 
 <file path=customXml/itemProps2.xml><?xml version="1.0" encoding="utf-8"?>
-<ds:datastoreItem xmlns:ds="http://schemas.openxmlformats.org/officeDocument/2006/customXml" ds:itemID="{52F3B215-496E-4790-A364-7C1C46DEC771}">
-  <ds:schemaRefs>
-    <ds:schemaRef ds:uri="http://schemas.microsoft.com/office/2006/metadata/properties"/>
-    <ds:schemaRef ds:uri="http://schemas.microsoft.com/office/infopath/2007/PartnerControls"/>
-    <ds:schemaRef ds:uri="71af3243-3dd4-4a8d-8c0d-dd76da1f02a5"/>
-  </ds:schemaRefs>
-</ds:datastoreItem>
-</file>
-
-<file path=customXml/itemProps3.xml><?xml version="1.0" encoding="utf-8"?>
 <ds:datastoreItem xmlns:ds="http://schemas.openxmlformats.org/officeDocument/2006/customXml" ds:itemID="{50DB95DD-0319-4EE5-8C5C-9CEDF75E024B}">
   <ds:schemaRefs>
     <ds:schemaRef ds:uri="http://schemas.microsoft.com/office/2006/metadata/contentType"/>
@@ -5253,4 +5802,14 @@
     <ds:schemaRef ds:uri="http://schemas.microsoft.com/internal/obd"/>
   </ds:schemaRefs>
 </ds:datastoreItem>
+</file>
+
+<file path=customXml/itemProps3.xml><?xml version="1.0" encoding="utf-8"?>
+<ds:datastoreItem xmlns:ds="http://schemas.openxmlformats.org/officeDocument/2006/customXml" ds:itemID="{52F3B215-496E-4790-A364-7C1C46DEC771}">
+  <ds:schemaRefs>
+    <ds:schemaRef ds:uri="http://schemas.microsoft.com/office/2006/metadata/properties"/>
+    <ds:schemaRef ds:uri="http://schemas.microsoft.com/office/infopath/2007/PartnerControls"/>
+    <ds:schemaRef ds:uri="71af3243-3dd4-4a8d-8c0d-dd76da1f02a5"/>
+  </ds:schemaRefs>
+</ds:datastoreItem>
 </file>
</xml_diff>

<commit_message>
changing MCC placement on slide 7
</commit_message>
<xml_diff>
--- a/group-3-M09-final-presentation.pptx
+++ b/group-3-M09-final-presentation.pptx
@@ -4906,8 +4906,8 @@
         </p:blipFill>
         <p:spPr>
           <a:xfrm>
-            <a:off x="2267779" y="911232"/>
-            <a:ext cx="7656442" cy="2556847"/>
+            <a:off x="2403565" y="911232"/>
+            <a:ext cx="7419704" cy="2556847"/>
           </a:xfrm>
         </p:spPr>
       </p:pic>
@@ -4933,8 +4933,8 @@
         </p:blipFill>
         <p:spPr>
           <a:xfrm>
-            <a:off x="2267779" y="3468079"/>
-            <a:ext cx="7656443" cy="2747327"/>
+            <a:off x="2403565" y="3468079"/>
+            <a:ext cx="7419705" cy="2747327"/>
           </a:xfrm>
           <a:prstGeom prst="rect">
             <a:avLst/>
@@ -5303,35 +5303,16 @@
             </a:r>
           </a:p>
           <a:p>
-            <a:pPr lvl="1"/>
-            <a:r>
-              <a:rPr lang="en-US" sz="1600" dirty="0"/>
+            <a:r>
+              <a:rPr lang="en-US" sz="1800" dirty="0"/>
               <a:t>MCC for SVM = 0.51</a:t>
             </a:r>
           </a:p>
           <a:p>
-            <a:pPr lvl="1"/>
-            <a:r>
-              <a:rPr lang="en-US" sz="1600" dirty="0"/>
+            <a:r>
+              <a:rPr lang="en-US" sz="1800" dirty="0"/>
               <a:t>MCC for Logistic Regression = 0.54</a:t>
             </a:r>
-          </a:p>
-          <a:p>
-            <a:r>
-              <a:rPr lang="en-US" sz="1800" dirty="0"/>
-              <a:t>Potential improvements:</a:t>
-            </a:r>
-          </a:p>
-          <a:p>
-            <a:pPr lvl="1"/>
-            <a:r>
-              <a:rPr lang="en-US" sz="1600" dirty="0"/>
-              <a:t>Data did not differentiate between type 1 and type 2 diabetes</a:t>
-            </a:r>
-          </a:p>
-          <a:p>
-            <a:pPr lvl="1"/>
-            <a:endParaRPr lang="en-US" sz="1800" dirty="0"/>
           </a:p>
         </p:txBody>
       </p:sp>
@@ -5677,6 +5658,15 @@
 </file>
 
 <file path=customXml/item2.xml><?xml version="1.0" encoding="utf-8"?>
+<?mso-contentType ?>
+<FormTemplates xmlns="http://schemas.microsoft.com/sharepoint/v3/contenttype/forms">
+  <Display>DocumentLibraryForm</Display>
+  <Edit>DocumentLibraryForm</Edit>
+  <New>DocumentLibraryForm</New>
+</FormTemplates>
+</file>
+
+<file path=customXml/item3.xml><?xml version="1.0" encoding="utf-8"?>
 <ct:contentTypeSchema xmlns:ct="http://schemas.microsoft.com/office/2006/metadata/contentType" xmlns:ma="http://schemas.microsoft.com/office/2006/metadata/properties/metaAttributes" ct:_="" ma:_="" ma:contentTypeName="Document" ma:contentTypeID="0x01010079F111ED35F8CC479449609E8A0923A6" ma:contentTypeVersion="12" ma:contentTypeDescription="Create a new document." ma:contentTypeScope="" ma:versionID="a410dd7f93c95333ffa1b60ed6adedd1">
   <xsd:schema xmlns:xsd="http://www.w3.org/2001/XMLSchema" xmlns:xs="http://www.w3.org/2001/XMLSchema" xmlns:p="http://schemas.microsoft.com/office/2006/metadata/properties" xmlns:ns2="71af3243-3dd4-4a8d-8c0d-dd76da1f02a5" xmlns:ns3="16c05727-aa75-4e4a-9b5f-8a80a1165891" targetNamespace="http://schemas.microsoft.com/office/2006/metadata/properties" ma:root="true" ma:fieldsID="a936d9baba76aa3866493feff160faab" ns2:_="" ns3:_="">
     <xsd:import namespace="71af3243-3dd4-4a8d-8c0d-dd76da1f02a5"/>
@@ -5897,15 +5887,6 @@
 </ct:contentTypeSchema>
 </file>
 
-<file path=customXml/item3.xml><?xml version="1.0" encoding="utf-8"?>
-<?mso-contentType ?>
-<FormTemplates xmlns="http://schemas.microsoft.com/sharepoint/v3/contenttype/forms">
-  <Display>DocumentLibraryForm</Display>
-  <Edit>DocumentLibraryForm</Edit>
-  <New>DocumentLibraryForm</New>
-</FormTemplates>
-</file>
-
 <file path=customXml/itemProps1.xml><?xml version="1.0" encoding="utf-8"?>
 <ds:datastoreItem xmlns:ds="http://schemas.openxmlformats.org/officeDocument/2006/customXml" ds:itemID="{52F3B215-496E-4790-A364-7C1C46DEC771}">
   <ds:schemaRefs>
@@ -5917,6 +5898,14 @@
 </file>
 
 <file path=customXml/itemProps2.xml><?xml version="1.0" encoding="utf-8"?>
+<ds:datastoreItem xmlns:ds="http://schemas.openxmlformats.org/officeDocument/2006/customXml" ds:itemID="{AE2713E1-6312-427E-BFCB-C5A5DA301373}">
+  <ds:schemaRefs>
+    <ds:schemaRef ds:uri="http://schemas.microsoft.com/sharepoint/v3/contenttype/forms"/>
+  </ds:schemaRefs>
+</ds:datastoreItem>
+</file>
+
+<file path=customXml/itemProps3.xml><?xml version="1.0" encoding="utf-8"?>
 <ds:datastoreItem xmlns:ds="http://schemas.openxmlformats.org/officeDocument/2006/customXml" ds:itemID="{50DB95DD-0319-4EE5-8C5C-9CEDF75E024B}">
   <ds:schemaRefs>
     <ds:schemaRef ds:uri="http://schemas.microsoft.com/office/2006/metadata/contentType"/>
@@ -5933,12 +5922,4 @@
     <ds:schemaRef ds:uri="http://schemas.microsoft.com/internal/obd"/>
   </ds:schemaRefs>
 </ds:datastoreItem>
-</file>
-
-<file path=customXml/itemProps3.xml><?xml version="1.0" encoding="utf-8"?>
-<ds:datastoreItem xmlns:ds="http://schemas.openxmlformats.org/officeDocument/2006/customXml" ds:itemID="{AE2713E1-6312-427E-BFCB-C5A5DA301373}">
-  <ds:schemaRefs>
-    <ds:schemaRef ds:uri="http://schemas.microsoft.com/sharepoint/v3/contenttype/forms"/>
-  </ds:schemaRefs>
-</ds:datastoreItem>
 </file>
</xml_diff>